<commit_message>
Update Multimodal personalized multiuser Home Assistant.pptx
</commit_message>
<xml_diff>
--- a/Multimodal personalized multiuser Home Assistant.pptx
+++ b/Multimodal personalized multiuser Home Assistant.pptx
@@ -7,13 +7,14 @@
   <p:sldIdLst>
     <p:sldId id="256" r:id="rId2"/>
     <p:sldId id="257" r:id="rId3"/>
-    <p:sldId id="258" r:id="rId4"/>
-    <p:sldId id="259" r:id="rId5"/>
-    <p:sldId id="260" r:id="rId6"/>
-    <p:sldId id="263" r:id="rId7"/>
-    <p:sldId id="261" r:id="rId8"/>
-    <p:sldId id="264" r:id="rId9"/>
-    <p:sldId id="262" r:id="rId10"/>
+    <p:sldId id="265" r:id="rId4"/>
+    <p:sldId id="258" r:id="rId5"/>
+    <p:sldId id="259" r:id="rId6"/>
+    <p:sldId id="260" r:id="rId7"/>
+    <p:sldId id="263" r:id="rId8"/>
+    <p:sldId id="261" r:id="rId9"/>
+    <p:sldId id="264" r:id="rId10"/>
+    <p:sldId id="262" r:id="rId11"/>
   </p:sldIdLst>
   <p:sldSz cx="12192000" cy="6858000"/>
   <p:notesSz cx="6858000" cy="9144000"/>
@@ -4274,7 +4275,7 @@
 </p:sld>
 </file>
 
-<file path=ppt/slides/slide2.xml><?xml version="1.0" encoding="utf-8"?>
+<file path=ppt/slides/slide10.xml><?xml version="1.0" encoding="utf-8"?>
 <p:sld xmlns:a="http://schemas.openxmlformats.org/drawingml/2006/main" xmlns:r="http://schemas.openxmlformats.org/officeDocument/2006/relationships" xmlns:p="http://schemas.openxmlformats.org/presentationml/2006/main">
   <p:cSld>
     <p:bg>
@@ -4301,10 +4302,10 @@
       </p:grpSpPr>
       <p:sp useBgFill="1">
         <p:nvSpPr>
-          <p:cNvPr id="44" name="Rectangle 43">
-            <a:extLst>
-              <a:ext uri="{FF2B5EF4-FFF2-40B4-BE49-F238E27FC236}">
-                <a16:creationId xmlns:a16="http://schemas.microsoft.com/office/drawing/2014/main" id="{8E2CC403-21CD-41DF-BAC4-329D7FF03C5C}"/>
+          <p:cNvPr id="8" name="Rectangle 7">
+            <a:extLst>
+              <a:ext uri="{FF2B5EF4-FFF2-40B4-BE49-F238E27FC236}">
+                <a16:creationId xmlns:a16="http://schemas.microsoft.com/office/drawing/2014/main" id="{B6CDA21F-E7AF-4C75-8395-33F58D5B0E45}"/>
               </a:ext>
               <a:ext uri="{C183D7F6-B498-43B3-948B-1728B52AA6E4}">
                 <adec:decorative xmlns:adec="http://schemas.microsoft.com/office/drawing/2017/decorative" val="1"/>
@@ -4359,6 +4360,526 @@
           </a:p>
         </p:txBody>
       </p:sp>
+      <p:grpSp>
+        <p:nvGrpSpPr>
+          <p:cNvPr id="10" name="Group 9">
+            <a:extLst>
+              <a:ext uri="{FF2B5EF4-FFF2-40B4-BE49-F238E27FC236}">
+                <a16:creationId xmlns:a16="http://schemas.microsoft.com/office/drawing/2014/main" id="{AE1C45F0-260A-458C-96ED-C1F6D2151219}"/>
+              </a:ext>
+              <a:ext uri="{C183D7F6-B498-43B3-948B-1728B52AA6E4}">
+                <adec:decorative xmlns:adec="http://schemas.microsoft.com/office/drawing/2017/decorative" val="1"/>
+              </a:ext>
+            </a:extLst>
+          </p:cNvPr>
+          <p:cNvGrpSpPr>
+            <a:grpSpLocks noGrp="1" noUngrp="1" noRot="1" noChangeAspect="1" noMove="1" noResize="1"/>
+          </p:cNvGrpSpPr>
+          <p:nvPr>
+            <p:extLst>
+              <p:ext uri="{386F3935-93C4-4BCD-93E2-E3B085C9AB24}">
+                <p16:designElem xmlns:p16="http://schemas.microsoft.com/office/powerpoint/2015/main" val="1"/>
+              </p:ext>
+            </p:extLst>
+          </p:nvPr>
+        </p:nvGrpSpPr>
+        <p:grpSpPr>
+          <a:xfrm>
+            <a:off x="4" y="1216597"/>
+            <a:ext cx="731521" cy="673460"/>
+            <a:chOff x="3940602" y="308034"/>
+            <a:chExt cx="2116791" cy="3428999"/>
+          </a:xfrm>
+          <a:solidFill>
+            <a:schemeClr val="accent4"/>
+          </a:solidFill>
+        </p:grpSpPr>
+        <p:sp>
+          <p:nvSpPr>
+            <p:cNvPr id="11" name="Rectangle 10">
+              <a:extLst>
+                <a:ext uri="{FF2B5EF4-FFF2-40B4-BE49-F238E27FC236}">
+                  <a16:creationId xmlns:a16="http://schemas.microsoft.com/office/drawing/2014/main" id="{A6604B49-AD5C-4590-B051-06C8222ECD99}"/>
+                </a:ext>
+                <a:ext uri="{C183D7F6-B498-43B3-948B-1728B52AA6E4}">
+                  <adec:decorative xmlns:adec="http://schemas.microsoft.com/office/drawing/2017/decorative" val="1"/>
+                </a:ext>
+              </a:extLst>
+            </p:cNvPr>
+            <p:cNvSpPr/>
+            <p:nvPr>
+              <p:extLst>
+                <p:ext uri="{386F3935-93C4-4BCD-93E2-E3B085C9AB24}">
+                  <p16:designElem xmlns:p16="http://schemas.microsoft.com/office/powerpoint/2015/main" val="1"/>
+                </p:ext>
+              </p:extLst>
+            </p:nvPr>
+          </p:nvSpPr>
+          <p:spPr>
+            <a:xfrm>
+              <a:off x="3940602" y="308034"/>
+              <a:ext cx="566743" cy="3428999"/>
+            </a:xfrm>
+            <a:prstGeom prst="rect">
+              <a:avLst/>
+            </a:prstGeom>
+            <a:grpFill/>
+            <a:ln>
+              <a:noFill/>
+            </a:ln>
+          </p:spPr>
+          <p:style>
+            <a:lnRef idx="2">
+              <a:schemeClr val="accent1">
+                <a:shade val="50000"/>
+              </a:schemeClr>
+            </a:lnRef>
+            <a:fillRef idx="1">
+              <a:schemeClr val="accent1"/>
+            </a:fillRef>
+            <a:effectRef idx="0">
+              <a:schemeClr val="accent1"/>
+            </a:effectRef>
+            <a:fontRef idx="minor">
+              <a:schemeClr val="lt1"/>
+            </a:fontRef>
+          </p:style>
+          <p:txBody>
+            <a:bodyPr rtlCol="0" anchor="ctr"/>
+            <a:lstStyle/>
+            <a:p>
+              <a:pPr algn="ctr"/>
+              <a:endParaRPr lang="en-US"/>
+            </a:p>
+          </p:txBody>
+        </p:sp>
+        <p:sp>
+          <p:nvSpPr>
+            <p:cNvPr id="12" name="Rectangle 11">
+              <a:extLst>
+                <a:ext uri="{FF2B5EF4-FFF2-40B4-BE49-F238E27FC236}">
+                  <a16:creationId xmlns:a16="http://schemas.microsoft.com/office/drawing/2014/main" id="{743ECCAF-29C5-4537-947C-7EA1292463DB}"/>
+                </a:ext>
+                <a:ext uri="{C183D7F6-B498-43B3-948B-1728B52AA6E4}">
+                  <adec:decorative xmlns:adec="http://schemas.microsoft.com/office/drawing/2017/decorative" val="1"/>
+                </a:ext>
+              </a:extLst>
+            </p:cNvPr>
+            <p:cNvSpPr/>
+            <p:nvPr>
+              <p:extLst>
+                <p:ext uri="{386F3935-93C4-4BCD-93E2-E3B085C9AB24}">
+                  <p16:designElem xmlns:p16="http://schemas.microsoft.com/office/powerpoint/2015/main" val="1"/>
+                </p:ext>
+              </p:extLst>
+            </p:nvPr>
+          </p:nvSpPr>
+          <p:spPr>
+            <a:xfrm>
+              <a:off x="4715626" y="308034"/>
+              <a:ext cx="566743" cy="3428999"/>
+            </a:xfrm>
+            <a:prstGeom prst="rect">
+              <a:avLst/>
+            </a:prstGeom>
+            <a:grpFill/>
+            <a:ln>
+              <a:noFill/>
+            </a:ln>
+          </p:spPr>
+          <p:style>
+            <a:lnRef idx="2">
+              <a:schemeClr val="accent1">
+                <a:shade val="50000"/>
+              </a:schemeClr>
+            </a:lnRef>
+            <a:fillRef idx="1">
+              <a:schemeClr val="accent1"/>
+            </a:fillRef>
+            <a:effectRef idx="0">
+              <a:schemeClr val="accent1"/>
+            </a:effectRef>
+            <a:fontRef idx="minor">
+              <a:schemeClr val="lt1"/>
+            </a:fontRef>
+          </p:style>
+          <p:txBody>
+            <a:bodyPr rtlCol="0" anchor="ctr"/>
+            <a:lstStyle/>
+            <a:p>
+              <a:pPr algn="ctr"/>
+              <a:endParaRPr lang="en-US"/>
+            </a:p>
+          </p:txBody>
+        </p:sp>
+        <p:sp>
+          <p:nvSpPr>
+            <p:cNvPr id="13" name="Rectangle 12">
+              <a:extLst>
+                <a:ext uri="{FF2B5EF4-FFF2-40B4-BE49-F238E27FC236}">
+                  <a16:creationId xmlns:a16="http://schemas.microsoft.com/office/drawing/2014/main" id="{ED49787B-8DE6-4467-AD0A-8DECC6E0C2D6}"/>
+                </a:ext>
+                <a:ext uri="{C183D7F6-B498-43B3-948B-1728B52AA6E4}">
+                  <adec:decorative xmlns:adec="http://schemas.microsoft.com/office/drawing/2017/decorative" val="1"/>
+                </a:ext>
+              </a:extLst>
+            </p:cNvPr>
+            <p:cNvSpPr/>
+            <p:nvPr>
+              <p:extLst>
+                <p:ext uri="{386F3935-93C4-4BCD-93E2-E3B085C9AB24}">
+                  <p16:designElem xmlns:p16="http://schemas.microsoft.com/office/powerpoint/2015/main" val="1"/>
+                </p:ext>
+              </p:extLst>
+            </p:nvPr>
+          </p:nvSpPr>
+          <p:spPr>
+            <a:xfrm>
+              <a:off x="5490650" y="308034"/>
+              <a:ext cx="566743" cy="3428999"/>
+            </a:xfrm>
+            <a:prstGeom prst="rect">
+              <a:avLst/>
+            </a:prstGeom>
+            <a:grpFill/>
+            <a:ln>
+              <a:noFill/>
+            </a:ln>
+          </p:spPr>
+          <p:style>
+            <a:lnRef idx="2">
+              <a:schemeClr val="accent1">
+                <a:shade val="50000"/>
+              </a:schemeClr>
+            </a:lnRef>
+            <a:fillRef idx="1">
+              <a:schemeClr val="accent1"/>
+            </a:fillRef>
+            <a:effectRef idx="0">
+              <a:schemeClr val="accent1"/>
+            </a:effectRef>
+            <a:fontRef idx="minor">
+              <a:schemeClr val="lt1"/>
+            </a:fontRef>
+          </p:style>
+          <p:txBody>
+            <a:bodyPr rtlCol="0" anchor="ctr"/>
+            <a:lstStyle/>
+            <a:p>
+              <a:pPr algn="ctr"/>
+              <a:endParaRPr lang="en-US"/>
+            </a:p>
+          </p:txBody>
+        </p:sp>
+      </p:grpSp>
+      <p:sp>
+        <p:nvSpPr>
+          <p:cNvPr id="15" name="Rectangle 14">
+            <a:extLst>
+              <a:ext uri="{FF2B5EF4-FFF2-40B4-BE49-F238E27FC236}">
+                <a16:creationId xmlns:a16="http://schemas.microsoft.com/office/drawing/2014/main" id="{D5B0017B-2ECA-49AF-B397-DC140825DF8D}"/>
+              </a:ext>
+              <a:ext uri="{C183D7F6-B498-43B3-948B-1728B52AA6E4}">
+                <adec:decorative xmlns:adec="http://schemas.microsoft.com/office/drawing/2017/decorative" val="1"/>
+              </a:ext>
+            </a:extLst>
+          </p:cNvPr>
+          <p:cNvSpPr>
+            <a:spLocks noGrp="1" noRot="1" noChangeAspect="1" noMove="1" noResize="1" noEditPoints="1" noAdjustHandles="1" noChangeArrowheads="1" noChangeShapeType="1" noTextEdit="1"/>
+          </p:cNvSpPr>
+          <p:nvPr>
+            <p:extLst>
+              <p:ext uri="{386F3935-93C4-4BCD-93E2-E3B085C9AB24}">
+                <p16:designElem xmlns:p16="http://schemas.microsoft.com/office/powerpoint/2015/main" val="1"/>
+              </p:ext>
+            </p:extLst>
+          </p:nvPr>
+        </p:nvSpPr>
+        <p:spPr>
+          <a:xfrm>
+            <a:off x="640079" y="613954"/>
+            <a:ext cx="10907487" cy="1894116"/>
+          </a:xfrm>
+          <a:prstGeom prst="rect">
+            <a:avLst/>
+          </a:prstGeom>
+          <a:solidFill>
+            <a:schemeClr val="bg1"/>
+          </a:solidFill>
+          <a:ln>
+            <a:noFill/>
+          </a:ln>
+          <a:effectLst>
+            <a:outerShdw blurRad="139700" dist="127000" dir="5400000" algn="t" rotWithShape="0">
+              <a:prstClr val="black">
+                <a:alpha val="15000"/>
+              </a:prstClr>
+            </a:outerShdw>
+          </a:effectLst>
+        </p:spPr>
+        <p:style>
+          <a:lnRef idx="2">
+            <a:schemeClr val="accent1">
+              <a:shade val="50000"/>
+            </a:schemeClr>
+          </a:lnRef>
+          <a:fillRef idx="1">
+            <a:schemeClr val="accent1"/>
+          </a:fillRef>
+          <a:effectRef idx="0">
+            <a:schemeClr val="accent1"/>
+          </a:effectRef>
+          <a:fontRef idx="minor">
+            <a:schemeClr val="lt1"/>
+          </a:fontRef>
+        </p:style>
+        <p:txBody>
+          <a:bodyPr rtlCol="0" anchor="ctr"/>
+          <a:lstStyle/>
+          <a:p>
+            <a:pPr algn="ctr"/>
+            <a:endParaRPr lang="en-US"/>
+          </a:p>
+        </p:txBody>
+      </p:sp>
+      <p:sp>
+        <p:nvSpPr>
+          <p:cNvPr id="2" name="Title 1">
+            <a:extLst>
+              <a:ext uri="{FF2B5EF4-FFF2-40B4-BE49-F238E27FC236}">
+                <a16:creationId xmlns:a16="http://schemas.microsoft.com/office/drawing/2014/main" id="{292106E7-BD60-43C1-922B-4619E77E2AF3}"/>
+              </a:ext>
+            </a:extLst>
+          </p:cNvPr>
+          <p:cNvSpPr>
+            <a:spLocks noGrp="1"/>
+          </p:cNvSpPr>
+          <p:nvPr>
+            <p:ph type="title"/>
+          </p:nvPr>
+        </p:nvSpPr>
+        <p:spPr>
+          <a:xfrm>
+            <a:off x="1043631" y="809898"/>
+            <a:ext cx="9942716" cy="1554480"/>
+          </a:xfrm>
+        </p:spPr>
+        <p:txBody>
+          <a:bodyPr anchor="ctr">
+            <a:normAutofit/>
+          </a:bodyPr>
+          <a:lstStyle/>
+          <a:p>
+            <a:r>
+              <a:rPr lang="en-US" sz="4800"/>
+              <a:t>Interaction structure pt. II let’s have a talk</a:t>
+            </a:r>
+          </a:p>
+        </p:txBody>
+      </p:sp>
+      <p:sp>
+        <p:nvSpPr>
+          <p:cNvPr id="3" name="Content Placeholder 2">
+            <a:extLst>
+              <a:ext uri="{FF2B5EF4-FFF2-40B4-BE49-F238E27FC236}">
+                <a16:creationId xmlns:a16="http://schemas.microsoft.com/office/drawing/2014/main" id="{182AEB85-8B47-4ECB-932A-E56BBCEB062D}"/>
+              </a:ext>
+            </a:extLst>
+          </p:cNvPr>
+          <p:cNvSpPr>
+            <a:spLocks noGrp="1"/>
+          </p:cNvSpPr>
+          <p:nvPr>
+            <p:ph idx="1"/>
+          </p:nvPr>
+        </p:nvSpPr>
+        <p:spPr>
+          <a:xfrm>
+            <a:off x="1045028" y="3017522"/>
+            <a:ext cx="9941319" cy="3124658"/>
+          </a:xfrm>
+        </p:spPr>
+        <p:txBody>
+          <a:bodyPr anchor="ctr">
+            <a:normAutofit/>
+          </a:bodyPr>
+          <a:lstStyle/>
+          <a:p>
+            <a:r>
+              <a:rPr lang="en-US" sz="2400"/>
+              <a:t>Once a user is successfully recognized, interaction begins</a:t>
+            </a:r>
+          </a:p>
+          <a:p>
+            <a:r>
+              <a:rPr lang="en-US" sz="2400"/>
+              <a:t>The assistant initiates it, greeting the user and informing them of (eventual) pending notes left by other users of the same device</a:t>
+            </a:r>
+          </a:p>
+          <a:p>
+            <a:r>
+              <a:rPr lang="en-US" sz="2400"/>
+              <a:t>If the user is still in the room, it will further interact, asking if they want to leave notes for others, or remove or edit unheard notes they sent</a:t>
+            </a:r>
+          </a:p>
+          <a:p>
+            <a:r>
+              <a:rPr lang="en-US" sz="2400"/>
+              <a:t>Interaction terminates any time the user asks for exiting or leaves the camera frame entirely</a:t>
+            </a:r>
+          </a:p>
+        </p:txBody>
+      </p:sp>
+      <p:cxnSp>
+        <p:nvCxnSpPr>
+          <p:cNvPr id="17" name="Straight Connector 16">
+            <a:extLst>
+              <a:ext uri="{FF2B5EF4-FFF2-40B4-BE49-F238E27FC236}">
+                <a16:creationId xmlns:a16="http://schemas.microsoft.com/office/drawing/2014/main" id="{6CF1BAF6-AD41-4082-B212-8A1F9A2E8779}"/>
+              </a:ext>
+              <a:ext uri="{C183D7F6-B498-43B3-948B-1728B52AA6E4}">
+                <adec:decorative xmlns:adec="http://schemas.microsoft.com/office/drawing/2017/decorative" val="1"/>
+              </a:ext>
+            </a:extLst>
+          </p:cNvPr>
+          <p:cNvCxnSpPr>
+            <a:cxnSpLocks noGrp="1" noRot="1" noChangeAspect="1" noMove="1" noResize="1" noEditPoints="1" noAdjustHandles="1" noChangeArrowheads="1" noChangeShapeType="1"/>
+          </p:cNvCxnSpPr>
+          <p:nvPr>
+            <p:extLst>
+              <p:ext uri="{386F3935-93C4-4BCD-93E2-E3B085C9AB24}">
+                <p16:designElem xmlns:p16="http://schemas.microsoft.com/office/powerpoint/2015/main" val="1"/>
+              </p:ext>
+            </p:extLst>
+          </p:nvPr>
+        </p:nvCxnSpPr>
+        <p:spPr>
+          <a:xfrm flipH="1">
+            <a:off x="838200" y="6485313"/>
+            <a:ext cx="10515600" cy="0"/>
+          </a:xfrm>
+          <a:prstGeom prst="line">
+            <a:avLst/>
+          </a:prstGeom>
+          <a:ln w="57150">
+            <a:solidFill>
+              <a:schemeClr val="accent4"/>
+            </a:solidFill>
+          </a:ln>
+        </p:spPr>
+        <p:style>
+          <a:lnRef idx="1">
+            <a:schemeClr val="accent1"/>
+          </a:lnRef>
+          <a:fillRef idx="0">
+            <a:schemeClr val="accent1"/>
+          </a:fillRef>
+          <a:effectRef idx="0">
+            <a:schemeClr val="accent1"/>
+          </a:effectRef>
+          <a:fontRef idx="minor">
+            <a:schemeClr val="tx1"/>
+          </a:fontRef>
+        </p:style>
+      </p:cxnSp>
+    </p:spTree>
+    <p:extLst>
+      <p:ext uri="{BB962C8B-B14F-4D97-AF65-F5344CB8AC3E}">
+        <p14:creationId xmlns:p14="http://schemas.microsoft.com/office/powerpoint/2010/main" val="2344798236"/>
+      </p:ext>
+    </p:extLst>
+  </p:cSld>
+  <p:clrMapOvr>
+    <a:masterClrMapping/>
+  </p:clrMapOvr>
+</p:sld>
+</file>
+
+<file path=ppt/slides/slide2.xml><?xml version="1.0" encoding="utf-8"?>
+<p:sld xmlns:a="http://schemas.openxmlformats.org/drawingml/2006/main" xmlns:r="http://schemas.openxmlformats.org/officeDocument/2006/relationships" xmlns:p="http://schemas.openxmlformats.org/presentationml/2006/main">
+  <p:cSld>
+    <p:bg>
+      <p:bgPr>
+        <a:solidFill>
+          <a:srgbClr val="023047"/>
+        </a:solidFill>
+        <a:effectLst/>
+      </p:bgPr>
+    </p:bg>
+    <p:spTree>
+      <p:nvGrpSpPr>
+        <p:cNvPr id="1" name=""/>
+        <p:cNvGrpSpPr/>
+        <p:nvPr/>
+      </p:nvGrpSpPr>
+      <p:grpSpPr>
+        <a:xfrm>
+          <a:off x="0" y="0"/>
+          <a:ext cx="0" cy="0"/>
+          <a:chOff x="0" y="0"/>
+          <a:chExt cx="0" cy="0"/>
+        </a:xfrm>
+      </p:grpSpPr>
+      <p:sp useBgFill="1">
+        <p:nvSpPr>
+          <p:cNvPr id="44" name="Rectangle 43">
+            <a:extLst>
+              <a:ext uri="{FF2B5EF4-FFF2-40B4-BE49-F238E27FC236}">
+                <a16:creationId xmlns:a16="http://schemas.microsoft.com/office/drawing/2014/main" id="{8E2CC403-21CD-41DF-BAC4-329D7FF03C5C}"/>
+              </a:ext>
+              <a:ext uri="{C183D7F6-B498-43B3-948B-1728B52AA6E4}">
+                <adec:decorative xmlns:adec="http://schemas.microsoft.com/office/drawing/2017/decorative" val="1"/>
+              </a:ext>
+            </a:extLst>
+          </p:cNvPr>
+          <p:cNvSpPr>
+            <a:spLocks noGrp="1" noRot="1" noChangeAspect="1" noMove="1" noResize="1" noEditPoints="1" noAdjustHandles="1" noChangeArrowheads="1" noChangeShapeType="1" noTextEdit="1"/>
+          </p:cNvSpPr>
+          <p:nvPr>
+            <p:extLst>
+              <p:ext uri="{386F3935-93C4-4BCD-93E2-E3B085C9AB24}">
+                <p16:designElem xmlns:p16="http://schemas.microsoft.com/office/powerpoint/2015/main" val="1"/>
+              </p:ext>
+            </p:extLst>
+          </p:nvPr>
+        </p:nvSpPr>
+        <p:spPr>
+          <a:xfrm>
+            <a:off x="0" y="0"/>
+            <a:ext cx="12191999" cy="6857365"/>
+          </a:xfrm>
+          <a:prstGeom prst="rect">
+            <a:avLst/>
+          </a:prstGeom>
+          <a:ln>
+            <a:noFill/>
+          </a:ln>
+        </p:spPr>
+        <p:style>
+          <a:lnRef idx="2">
+            <a:schemeClr val="accent1">
+              <a:shade val="50000"/>
+            </a:schemeClr>
+          </a:lnRef>
+          <a:fillRef idx="1">
+            <a:schemeClr val="accent1"/>
+          </a:fillRef>
+          <a:effectRef idx="0">
+            <a:schemeClr val="accent1"/>
+          </a:effectRef>
+          <a:fontRef idx="minor">
+            <a:schemeClr val="lt1"/>
+          </a:fontRef>
+        </p:style>
+        <p:txBody>
+          <a:bodyPr rtlCol="0" anchor="ctr"/>
+          <a:lstStyle/>
+          <a:p>
+            <a:pPr algn="ctr"/>
+            <a:endParaRPr lang="en-US"/>
+          </a:p>
+        </p:txBody>
+      </p:sp>
       <p:sp>
         <p:nvSpPr>
           <p:cNvPr id="4" name="Title 3">
@@ -4388,9 +4909,9 @@
           <a:lstStyle/>
           <a:p>
             <a:r>
-              <a:rPr lang="en-US" kern="1200">
+              <a:rPr lang="en-US" kern="1200" dirty="0">
                 <a:solidFill>
-                  <a:schemeClr val="tx1"/>
+                  <a:srgbClr val="FFC000"/>
                 </a:solidFill>
                 <a:latin typeface="+mj-lt"/>
                 <a:ea typeface="+mj-ea"/>
@@ -4775,9 +5296,9 @@
           <a:lstStyle/>
           <a:p>
             <a:r>
-              <a:rPr lang="en-US" kern="1200">
+              <a:rPr lang="en-US" kern="1200" dirty="0">
                 <a:solidFill>
-                  <a:schemeClr val="tx1"/>
+                  <a:srgbClr val="023047"/>
                 </a:solidFill>
                 <a:latin typeface="+mn-lt"/>
                 <a:ea typeface="+mn-ea"/>
@@ -4807,7 +5328,7 @@
     <p:bg>
       <p:bgPr>
         <a:solidFill>
-          <a:schemeClr val="bg1"/>
+          <a:srgbClr val="023047"/>
         </a:solidFill>
         <a:effectLst/>
       </p:bgPr>
@@ -5197,8 +5718,12 @@
           <a:lstStyle/>
           <a:p>
             <a:r>
-              <a:rPr lang="en-US" sz="4800"/>
-              <a:t>Concepts</a:t>
+              <a:rPr lang="en-US" sz="4800" b="1" dirty="0">
+                <a:solidFill>
+                  <a:srgbClr val="023047"/>
+                </a:solidFill>
+              </a:rPr>
+              <a:t>Outline</a:t>
             </a:r>
           </a:p>
         </p:txBody>
@@ -5232,25 +5757,633 @@
           <a:lstStyle/>
           <a:p>
             <a:r>
-              <a:rPr lang="en-US" sz="2400"/>
+              <a:rPr lang="en-US" sz="2400" dirty="0">
+                <a:solidFill>
+                  <a:srgbClr val="FFC000"/>
+                </a:solidFill>
+              </a:rPr>
+              <a:t>Introduction</a:t>
+            </a:r>
+          </a:p>
+          <a:p>
+            <a:r>
+              <a:rPr lang="en-US" sz="2400" dirty="0">
+                <a:solidFill>
+                  <a:srgbClr val="FFC000"/>
+                </a:solidFill>
+              </a:rPr>
+              <a:t>Architecture</a:t>
+            </a:r>
+          </a:p>
+          <a:p>
+            <a:r>
+              <a:rPr lang="en-US" sz="2400" dirty="0">
+                <a:solidFill>
+                  <a:srgbClr val="FFC000"/>
+                </a:solidFill>
+              </a:rPr>
+              <a:t>Demo</a:t>
+            </a:r>
+          </a:p>
+          <a:p>
+            <a:r>
+              <a:rPr lang="en-US" sz="2400" dirty="0">
+                <a:solidFill>
+                  <a:srgbClr val="FFC000"/>
+                </a:solidFill>
+              </a:rPr>
+              <a:t>Conclusions and future works</a:t>
+            </a:r>
+          </a:p>
+        </p:txBody>
+      </p:sp>
+      <p:cxnSp>
+        <p:nvCxnSpPr>
+          <p:cNvPr id="28" name="Straight Connector 27">
+            <a:extLst>
+              <a:ext uri="{FF2B5EF4-FFF2-40B4-BE49-F238E27FC236}">
+                <a16:creationId xmlns:a16="http://schemas.microsoft.com/office/drawing/2014/main" id="{6CF1BAF6-AD41-4082-B212-8A1F9A2E8779}"/>
+              </a:ext>
+              <a:ext uri="{C183D7F6-B498-43B3-948B-1728B52AA6E4}">
+                <adec:decorative xmlns:adec="http://schemas.microsoft.com/office/drawing/2017/decorative" val="1"/>
+              </a:ext>
+            </a:extLst>
+          </p:cNvPr>
+          <p:cNvCxnSpPr>
+            <a:cxnSpLocks noGrp="1" noRot="1" noChangeAspect="1" noMove="1" noResize="1" noEditPoints="1" noAdjustHandles="1" noChangeArrowheads="1" noChangeShapeType="1"/>
+          </p:cNvCxnSpPr>
+          <p:nvPr>
+            <p:extLst>
+              <p:ext uri="{386F3935-93C4-4BCD-93E2-E3B085C9AB24}">
+                <p16:designElem xmlns:p16="http://schemas.microsoft.com/office/powerpoint/2015/main" val="1"/>
+              </p:ext>
+            </p:extLst>
+          </p:nvPr>
+        </p:nvCxnSpPr>
+        <p:spPr>
+          <a:xfrm flipH="1">
+            <a:off x="838200" y="6485313"/>
+            <a:ext cx="10515600" cy="0"/>
+          </a:xfrm>
+          <a:prstGeom prst="line">
+            <a:avLst/>
+          </a:prstGeom>
+          <a:ln w="57150">
+            <a:solidFill>
+              <a:schemeClr val="accent4"/>
+            </a:solidFill>
+          </a:ln>
+        </p:spPr>
+        <p:style>
+          <a:lnRef idx="1">
+            <a:schemeClr val="accent1"/>
+          </a:lnRef>
+          <a:fillRef idx="0">
+            <a:schemeClr val="accent1"/>
+          </a:fillRef>
+          <a:effectRef idx="0">
+            <a:schemeClr val="accent1"/>
+          </a:effectRef>
+          <a:fontRef idx="minor">
+            <a:schemeClr val="tx1"/>
+          </a:fontRef>
+        </p:style>
+      </p:cxnSp>
+    </p:spTree>
+    <p:extLst>
+      <p:ext uri="{BB962C8B-B14F-4D97-AF65-F5344CB8AC3E}">
+        <p14:creationId xmlns:p14="http://schemas.microsoft.com/office/powerpoint/2010/main" val="3398516479"/>
+      </p:ext>
+    </p:extLst>
+  </p:cSld>
+  <p:clrMapOvr>
+    <a:masterClrMapping/>
+  </p:clrMapOvr>
+</p:sld>
+</file>
+
+<file path=ppt/slides/slide4.xml><?xml version="1.0" encoding="utf-8"?>
+<p:sld xmlns:a="http://schemas.openxmlformats.org/drawingml/2006/main" xmlns:r="http://schemas.openxmlformats.org/officeDocument/2006/relationships" xmlns:p="http://schemas.openxmlformats.org/presentationml/2006/main">
+  <p:cSld>
+    <p:bg>
+      <p:bgPr>
+        <a:solidFill>
+          <a:schemeClr val="bg1"/>
+        </a:solidFill>
+        <a:effectLst/>
+      </p:bgPr>
+    </p:bg>
+    <p:spTree>
+      <p:nvGrpSpPr>
+        <p:cNvPr id="1" name=""/>
+        <p:cNvGrpSpPr/>
+        <p:nvPr/>
+      </p:nvGrpSpPr>
+      <p:grpSpPr>
+        <a:xfrm>
+          <a:off x="0" y="0"/>
+          <a:ext cx="0" cy="0"/>
+          <a:chOff x="0" y="0"/>
+          <a:chExt cx="0" cy="0"/>
+        </a:xfrm>
+      </p:grpSpPr>
+      <p:sp useBgFill="1">
+        <p:nvSpPr>
+          <p:cNvPr id="19" name="Rectangle 18">
+            <a:extLst>
+              <a:ext uri="{FF2B5EF4-FFF2-40B4-BE49-F238E27FC236}">
+                <a16:creationId xmlns:a16="http://schemas.microsoft.com/office/drawing/2014/main" id="{B6CDA21F-E7AF-4C75-8395-33F58D5B0E45}"/>
+              </a:ext>
+              <a:ext uri="{C183D7F6-B498-43B3-948B-1728B52AA6E4}">
+                <adec:decorative xmlns:adec="http://schemas.microsoft.com/office/drawing/2017/decorative" val="1"/>
+              </a:ext>
+            </a:extLst>
+          </p:cNvPr>
+          <p:cNvSpPr>
+            <a:spLocks noGrp="1" noRot="1" noChangeAspect="1" noMove="1" noResize="1" noEditPoints="1" noAdjustHandles="1" noChangeArrowheads="1" noChangeShapeType="1" noTextEdit="1"/>
+          </p:cNvSpPr>
+          <p:nvPr>
+            <p:extLst>
+              <p:ext uri="{386F3935-93C4-4BCD-93E2-E3B085C9AB24}">
+                <p16:designElem xmlns:p16="http://schemas.microsoft.com/office/powerpoint/2015/main" val="1"/>
+              </p:ext>
+            </p:extLst>
+          </p:nvPr>
+        </p:nvSpPr>
+        <p:spPr>
+          <a:xfrm>
+            <a:off x="0" y="0"/>
+            <a:ext cx="12191999" cy="6857365"/>
+          </a:xfrm>
+          <a:prstGeom prst="rect">
+            <a:avLst/>
+          </a:prstGeom>
+          <a:ln>
+            <a:noFill/>
+          </a:ln>
+        </p:spPr>
+        <p:style>
+          <a:lnRef idx="2">
+            <a:schemeClr val="accent1">
+              <a:shade val="50000"/>
+            </a:schemeClr>
+          </a:lnRef>
+          <a:fillRef idx="1">
+            <a:schemeClr val="accent1"/>
+          </a:fillRef>
+          <a:effectRef idx="0">
+            <a:schemeClr val="accent1"/>
+          </a:effectRef>
+          <a:fontRef idx="minor">
+            <a:schemeClr val="lt1"/>
+          </a:fontRef>
+        </p:style>
+        <p:txBody>
+          <a:bodyPr rtlCol="0" anchor="ctr"/>
+          <a:lstStyle/>
+          <a:p>
+            <a:pPr algn="ctr"/>
+            <a:endParaRPr lang="en-US"/>
+          </a:p>
+        </p:txBody>
+      </p:sp>
+      <p:grpSp>
+        <p:nvGrpSpPr>
+          <p:cNvPr id="21" name="Group 20">
+            <a:extLst>
+              <a:ext uri="{FF2B5EF4-FFF2-40B4-BE49-F238E27FC236}">
+                <a16:creationId xmlns:a16="http://schemas.microsoft.com/office/drawing/2014/main" id="{AE1C45F0-260A-458C-96ED-C1F6D2151219}"/>
+              </a:ext>
+              <a:ext uri="{C183D7F6-B498-43B3-948B-1728B52AA6E4}">
+                <adec:decorative xmlns:adec="http://schemas.microsoft.com/office/drawing/2017/decorative" val="1"/>
+              </a:ext>
+            </a:extLst>
+          </p:cNvPr>
+          <p:cNvGrpSpPr>
+            <a:grpSpLocks noGrp="1" noUngrp="1" noRot="1" noChangeAspect="1" noMove="1" noResize="1"/>
+          </p:cNvGrpSpPr>
+          <p:nvPr>
+            <p:extLst>
+              <p:ext uri="{386F3935-93C4-4BCD-93E2-E3B085C9AB24}">
+                <p16:designElem xmlns:p16="http://schemas.microsoft.com/office/powerpoint/2015/main" val="1"/>
+              </p:ext>
+            </p:extLst>
+          </p:nvPr>
+        </p:nvGrpSpPr>
+        <p:grpSpPr>
+          <a:xfrm>
+            <a:off x="4" y="1216597"/>
+            <a:ext cx="731521" cy="673460"/>
+            <a:chOff x="3940602" y="308034"/>
+            <a:chExt cx="2116791" cy="3428999"/>
+          </a:xfrm>
+          <a:solidFill>
+            <a:schemeClr val="accent4"/>
+          </a:solidFill>
+        </p:grpSpPr>
+        <p:sp>
+          <p:nvSpPr>
+            <p:cNvPr id="22" name="Rectangle 21">
+              <a:extLst>
+                <a:ext uri="{FF2B5EF4-FFF2-40B4-BE49-F238E27FC236}">
+                  <a16:creationId xmlns:a16="http://schemas.microsoft.com/office/drawing/2014/main" id="{A6604B49-AD5C-4590-B051-06C8222ECD99}"/>
+                </a:ext>
+                <a:ext uri="{C183D7F6-B498-43B3-948B-1728B52AA6E4}">
+                  <adec:decorative xmlns:adec="http://schemas.microsoft.com/office/drawing/2017/decorative" val="1"/>
+                </a:ext>
+              </a:extLst>
+            </p:cNvPr>
+            <p:cNvSpPr/>
+            <p:nvPr>
+              <p:extLst>
+                <p:ext uri="{386F3935-93C4-4BCD-93E2-E3B085C9AB24}">
+                  <p16:designElem xmlns:p16="http://schemas.microsoft.com/office/powerpoint/2015/main" val="1"/>
+                </p:ext>
+              </p:extLst>
+            </p:nvPr>
+          </p:nvSpPr>
+          <p:spPr>
+            <a:xfrm>
+              <a:off x="3940602" y="308034"/>
+              <a:ext cx="566743" cy="3428999"/>
+            </a:xfrm>
+            <a:prstGeom prst="rect">
+              <a:avLst/>
+            </a:prstGeom>
+            <a:grpFill/>
+            <a:ln>
+              <a:noFill/>
+            </a:ln>
+          </p:spPr>
+          <p:style>
+            <a:lnRef idx="2">
+              <a:schemeClr val="accent1">
+                <a:shade val="50000"/>
+              </a:schemeClr>
+            </a:lnRef>
+            <a:fillRef idx="1">
+              <a:schemeClr val="accent1"/>
+            </a:fillRef>
+            <a:effectRef idx="0">
+              <a:schemeClr val="accent1"/>
+            </a:effectRef>
+            <a:fontRef idx="minor">
+              <a:schemeClr val="lt1"/>
+            </a:fontRef>
+          </p:style>
+          <p:txBody>
+            <a:bodyPr rtlCol="0" anchor="ctr"/>
+            <a:lstStyle/>
+            <a:p>
+              <a:pPr algn="ctr"/>
+              <a:endParaRPr lang="en-US"/>
+            </a:p>
+          </p:txBody>
+        </p:sp>
+        <p:sp>
+          <p:nvSpPr>
+            <p:cNvPr id="23" name="Rectangle 22">
+              <a:extLst>
+                <a:ext uri="{FF2B5EF4-FFF2-40B4-BE49-F238E27FC236}">
+                  <a16:creationId xmlns:a16="http://schemas.microsoft.com/office/drawing/2014/main" id="{743ECCAF-29C5-4537-947C-7EA1292463DB}"/>
+                </a:ext>
+                <a:ext uri="{C183D7F6-B498-43B3-948B-1728B52AA6E4}">
+                  <adec:decorative xmlns:adec="http://schemas.microsoft.com/office/drawing/2017/decorative" val="1"/>
+                </a:ext>
+              </a:extLst>
+            </p:cNvPr>
+            <p:cNvSpPr/>
+            <p:nvPr>
+              <p:extLst>
+                <p:ext uri="{386F3935-93C4-4BCD-93E2-E3B085C9AB24}">
+                  <p16:designElem xmlns:p16="http://schemas.microsoft.com/office/powerpoint/2015/main" val="1"/>
+                </p:ext>
+              </p:extLst>
+            </p:nvPr>
+          </p:nvSpPr>
+          <p:spPr>
+            <a:xfrm>
+              <a:off x="4715626" y="308034"/>
+              <a:ext cx="566743" cy="3428999"/>
+            </a:xfrm>
+            <a:prstGeom prst="rect">
+              <a:avLst/>
+            </a:prstGeom>
+            <a:grpFill/>
+            <a:ln>
+              <a:noFill/>
+            </a:ln>
+          </p:spPr>
+          <p:style>
+            <a:lnRef idx="2">
+              <a:schemeClr val="accent1">
+                <a:shade val="50000"/>
+              </a:schemeClr>
+            </a:lnRef>
+            <a:fillRef idx="1">
+              <a:schemeClr val="accent1"/>
+            </a:fillRef>
+            <a:effectRef idx="0">
+              <a:schemeClr val="accent1"/>
+            </a:effectRef>
+            <a:fontRef idx="minor">
+              <a:schemeClr val="lt1"/>
+            </a:fontRef>
+          </p:style>
+          <p:txBody>
+            <a:bodyPr rtlCol="0" anchor="ctr"/>
+            <a:lstStyle/>
+            <a:p>
+              <a:pPr algn="ctr"/>
+              <a:endParaRPr lang="en-US"/>
+            </a:p>
+          </p:txBody>
+        </p:sp>
+        <p:sp>
+          <p:nvSpPr>
+            <p:cNvPr id="24" name="Rectangle 23">
+              <a:extLst>
+                <a:ext uri="{FF2B5EF4-FFF2-40B4-BE49-F238E27FC236}">
+                  <a16:creationId xmlns:a16="http://schemas.microsoft.com/office/drawing/2014/main" id="{ED49787B-8DE6-4467-AD0A-8DECC6E0C2D6}"/>
+                </a:ext>
+                <a:ext uri="{C183D7F6-B498-43B3-948B-1728B52AA6E4}">
+                  <adec:decorative xmlns:adec="http://schemas.microsoft.com/office/drawing/2017/decorative" val="1"/>
+                </a:ext>
+              </a:extLst>
+            </p:cNvPr>
+            <p:cNvSpPr/>
+            <p:nvPr>
+              <p:extLst>
+                <p:ext uri="{386F3935-93C4-4BCD-93E2-E3B085C9AB24}">
+                  <p16:designElem xmlns:p16="http://schemas.microsoft.com/office/powerpoint/2015/main" val="1"/>
+                </p:ext>
+              </p:extLst>
+            </p:nvPr>
+          </p:nvSpPr>
+          <p:spPr>
+            <a:xfrm>
+              <a:off x="5490650" y="308034"/>
+              <a:ext cx="566743" cy="3428999"/>
+            </a:xfrm>
+            <a:prstGeom prst="rect">
+              <a:avLst/>
+            </a:prstGeom>
+            <a:grpFill/>
+            <a:ln>
+              <a:noFill/>
+            </a:ln>
+          </p:spPr>
+          <p:style>
+            <a:lnRef idx="2">
+              <a:schemeClr val="accent1">
+                <a:shade val="50000"/>
+              </a:schemeClr>
+            </a:lnRef>
+            <a:fillRef idx="1">
+              <a:schemeClr val="accent1"/>
+            </a:fillRef>
+            <a:effectRef idx="0">
+              <a:schemeClr val="accent1"/>
+            </a:effectRef>
+            <a:fontRef idx="minor">
+              <a:schemeClr val="lt1"/>
+            </a:fontRef>
+          </p:style>
+          <p:txBody>
+            <a:bodyPr rtlCol="0" anchor="ctr"/>
+            <a:lstStyle/>
+            <a:p>
+              <a:pPr algn="ctr"/>
+              <a:endParaRPr lang="en-US"/>
+            </a:p>
+          </p:txBody>
+        </p:sp>
+      </p:grpSp>
+      <p:sp>
+        <p:nvSpPr>
+          <p:cNvPr id="26" name="Rectangle 25">
+            <a:extLst>
+              <a:ext uri="{FF2B5EF4-FFF2-40B4-BE49-F238E27FC236}">
+                <a16:creationId xmlns:a16="http://schemas.microsoft.com/office/drawing/2014/main" id="{D5B0017B-2ECA-49AF-B397-DC140825DF8D}"/>
+              </a:ext>
+              <a:ext uri="{C183D7F6-B498-43B3-948B-1728B52AA6E4}">
+                <adec:decorative xmlns:adec="http://schemas.microsoft.com/office/drawing/2017/decorative" val="1"/>
+              </a:ext>
+            </a:extLst>
+          </p:cNvPr>
+          <p:cNvSpPr>
+            <a:spLocks noGrp="1" noRot="1" noChangeAspect="1" noMove="1" noResize="1" noEditPoints="1" noAdjustHandles="1" noChangeArrowheads="1" noChangeShapeType="1" noTextEdit="1"/>
+          </p:cNvSpPr>
+          <p:nvPr>
+            <p:extLst>
+              <p:ext uri="{386F3935-93C4-4BCD-93E2-E3B085C9AB24}">
+                <p16:designElem xmlns:p16="http://schemas.microsoft.com/office/powerpoint/2015/main" val="1"/>
+              </p:ext>
+            </p:extLst>
+          </p:nvPr>
+        </p:nvSpPr>
+        <p:spPr>
+          <a:xfrm>
+            <a:off x="640079" y="613954"/>
+            <a:ext cx="10907487" cy="1894116"/>
+          </a:xfrm>
+          <a:prstGeom prst="rect">
+            <a:avLst/>
+          </a:prstGeom>
+          <a:solidFill>
+            <a:schemeClr val="bg1"/>
+          </a:solidFill>
+          <a:ln>
+            <a:noFill/>
+          </a:ln>
+          <a:effectLst>
+            <a:outerShdw blurRad="139700" dist="127000" dir="5400000" algn="t" rotWithShape="0">
+              <a:prstClr val="black">
+                <a:alpha val="15000"/>
+              </a:prstClr>
+            </a:outerShdw>
+          </a:effectLst>
+        </p:spPr>
+        <p:style>
+          <a:lnRef idx="2">
+            <a:schemeClr val="accent1">
+              <a:shade val="50000"/>
+            </a:schemeClr>
+          </a:lnRef>
+          <a:fillRef idx="1">
+            <a:schemeClr val="accent1"/>
+          </a:fillRef>
+          <a:effectRef idx="0">
+            <a:schemeClr val="accent1"/>
+          </a:effectRef>
+          <a:fontRef idx="minor">
+            <a:schemeClr val="lt1"/>
+          </a:fontRef>
+        </p:style>
+        <p:txBody>
+          <a:bodyPr rtlCol="0" anchor="ctr"/>
+          <a:lstStyle/>
+          <a:p>
+            <a:pPr algn="ctr"/>
+            <a:endParaRPr lang="en-US"/>
+          </a:p>
+        </p:txBody>
+      </p:sp>
+      <p:sp>
+        <p:nvSpPr>
+          <p:cNvPr id="2" name="Rectangle 1">
+            <a:extLst>
+              <a:ext uri="{FF2B5EF4-FFF2-40B4-BE49-F238E27FC236}">
+                <a16:creationId xmlns:a16="http://schemas.microsoft.com/office/drawing/2014/main" id="{B8AC138F-44A0-4B4F-BEF6-0649147E5D29}"/>
+              </a:ext>
+            </a:extLst>
+          </p:cNvPr>
+          <p:cNvSpPr/>
+          <p:nvPr/>
+        </p:nvSpPr>
+        <p:spPr>
+          <a:xfrm>
+            <a:off x="640079" y="613954"/>
+            <a:ext cx="10907487" cy="1894116"/>
+          </a:xfrm>
+          <a:prstGeom prst="rect">
+            <a:avLst/>
+          </a:prstGeom>
+          <a:solidFill>
+            <a:srgbClr val="023047"/>
+          </a:solidFill>
+          <a:ln>
+            <a:noFill/>
+          </a:ln>
+        </p:spPr>
+        <p:style>
+          <a:lnRef idx="2">
+            <a:schemeClr val="accent1">
+              <a:shade val="50000"/>
+            </a:schemeClr>
+          </a:lnRef>
+          <a:fillRef idx="1">
+            <a:schemeClr val="accent1"/>
+          </a:fillRef>
+          <a:effectRef idx="0">
+            <a:schemeClr val="accent1"/>
+          </a:effectRef>
+          <a:fontRef idx="minor">
+            <a:schemeClr val="lt1"/>
+          </a:fontRef>
+        </p:style>
+        <p:txBody>
+          <a:bodyPr rtlCol="0" anchor="ctr"/>
+          <a:lstStyle/>
+          <a:p>
+            <a:pPr algn="ctr"/>
+            <a:endParaRPr lang="en-GB" dirty="0"/>
+          </a:p>
+        </p:txBody>
+      </p:sp>
+      <p:sp>
+        <p:nvSpPr>
+          <p:cNvPr id="4" name="Title 3">
+            <a:extLst>
+              <a:ext uri="{FF2B5EF4-FFF2-40B4-BE49-F238E27FC236}">
+                <a16:creationId xmlns:a16="http://schemas.microsoft.com/office/drawing/2014/main" id="{B7DBF6A7-D01A-4EE4-AA09-6BAEB427D14C}"/>
+              </a:ext>
+            </a:extLst>
+          </p:cNvPr>
+          <p:cNvSpPr>
+            <a:spLocks noGrp="1"/>
+          </p:cNvSpPr>
+          <p:nvPr>
+            <p:ph type="title"/>
+          </p:nvPr>
+        </p:nvSpPr>
+        <p:spPr>
+          <a:xfrm>
+            <a:off x="1043631" y="809898"/>
+            <a:ext cx="9942716" cy="1554480"/>
+          </a:xfrm>
+        </p:spPr>
+        <p:txBody>
+          <a:bodyPr anchor="ctr">
+            <a:normAutofit/>
+          </a:bodyPr>
+          <a:lstStyle/>
+          <a:p>
+            <a:r>
+              <a:rPr lang="en-US" sz="4800" b="1" dirty="0">
+                <a:solidFill>
+                  <a:srgbClr val="FFC000"/>
+                </a:solidFill>
+              </a:rPr>
+              <a:t>Concepts</a:t>
+            </a:r>
+          </a:p>
+        </p:txBody>
+      </p:sp>
+      <p:sp>
+        <p:nvSpPr>
+          <p:cNvPr id="5" name="Content Placeholder 4">
+            <a:extLst>
+              <a:ext uri="{FF2B5EF4-FFF2-40B4-BE49-F238E27FC236}">
+                <a16:creationId xmlns:a16="http://schemas.microsoft.com/office/drawing/2014/main" id="{5D518C88-56FE-421D-B854-7CD981F6F5EC}"/>
+              </a:ext>
+            </a:extLst>
+          </p:cNvPr>
+          <p:cNvSpPr>
+            <a:spLocks noGrp="1"/>
+          </p:cNvSpPr>
+          <p:nvPr>
+            <p:ph idx="1"/>
+          </p:nvPr>
+        </p:nvSpPr>
+        <p:spPr>
+          <a:xfrm>
+            <a:off x="1045028" y="3017522"/>
+            <a:ext cx="9941319" cy="3124658"/>
+          </a:xfrm>
+        </p:spPr>
+        <p:txBody>
+          <a:bodyPr anchor="ctr">
+            <a:normAutofit/>
+          </a:bodyPr>
+          <a:lstStyle/>
+          <a:p>
+            <a:r>
+              <a:rPr lang="en-US" sz="2400" dirty="0">
+                <a:solidFill>
+                  <a:srgbClr val="023047"/>
+                </a:solidFill>
+              </a:rPr>
               <a:t>Detect when a user enters the room using visual input</a:t>
             </a:r>
           </a:p>
           <a:p>
             <a:r>
-              <a:rPr lang="en-US" sz="2400"/>
+              <a:rPr lang="en-US" sz="2400" dirty="0">
+                <a:solidFill>
+                  <a:srgbClr val="023047"/>
+                </a:solidFill>
+              </a:rPr>
               <a:t>If possible, recognize the user and initiate interaction</a:t>
             </a:r>
           </a:p>
           <a:p>
             <a:r>
-              <a:rPr lang="en-US" sz="2400"/>
+              <a:rPr lang="en-US" sz="2400" dirty="0">
+                <a:solidFill>
+                  <a:srgbClr val="023047"/>
+                </a:solidFill>
+              </a:rPr>
               <a:t>Be able to learn to recognize new users and react to their presence in the future</a:t>
             </a:r>
           </a:p>
           <a:p>
             <a:r>
-              <a:rPr lang="en-US" sz="2400"/>
+              <a:rPr lang="en-US" sz="2400" dirty="0">
+                <a:solidFill>
+                  <a:srgbClr val="023047"/>
+                </a:solidFill>
+              </a:rPr>
               <a:t>Let users interact with each other by leaving virtual “sticky notes” that the assistant can output through voice synthetization </a:t>
             </a:r>
           </a:p>
@@ -5321,7 +6454,7 @@
 </p:sld>
 </file>
 
-<file path=ppt/slides/slide4.xml><?xml version="1.0" encoding="utf-8"?>
+<file path=ppt/slides/slide5.xml><?xml version="1.0" encoding="utf-8"?>
 <p:sld xmlns:a="http://schemas.openxmlformats.org/drawingml/2006/main" xmlns:r="http://schemas.openxmlformats.org/officeDocument/2006/relationships" xmlns:p="http://schemas.openxmlformats.org/presentationml/2006/main">
   <p:cSld>
     <p:bg>
@@ -5690,6 +6823,58 @@
       </p:sp>
       <p:sp>
         <p:nvSpPr>
+          <p:cNvPr id="11" name="Rectangle 10">
+            <a:extLst>
+              <a:ext uri="{FF2B5EF4-FFF2-40B4-BE49-F238E27FC236}">
+                <a16:creationId xmlns:a16="http://schemas.microsoft.com/office/drawing/2014/main" id="{FDCF5B91-B78C-40D3-B67C-E31B9DAD6A09}"/>
+              </a:ext>
+            </a:extLst>
+          </p:cNvPr>
+          <p:cNvSpPr/>
+          <p:nvPr/>
+        </p:nvSpPr>
+        <p:spPr>
+          <a:xfrm>
+            <a:off x="633597" y="640080"/>
+            <a:ext cx="10907487" cy="1894116"/>
+          </a:xfrm>
+          <a:prstGeom prst="rect">
+            <a:avLst/>
+          </a:prstGeom>
+          <a:solidFill>
+            <a:srgbClr val="023047"/>
+          </a:solidFill>
+          <a:ln>
+            <a:noFill/>
+          </a:ln>
+        </p:spPr>
+        <p:style>
+          <a:lnRef idx="2">
+            <a:schemeClr val="accent1">
+              <a:shade val="50000"/>
+            </a:schemeClr>
+          </a:lnRef>
+          <a:fillRef idx="1">
+            <a:schemeClr val="accent1"/>
+          </a:fillRef>
+          <a:effectRef idx="0">
+            <a:schemeClr val="accent1"/>
+          </a:effectRef>
+          <a:fontRef idx="minor">
+            <a:schemeClr val="lt1"/>
+          </a:fontRef>
+        </p:style>
+        <p:txBody>
+          <a:bodyPr rtlCol="0" anchor="ctr"/>
+          <a:lstStyle/>
+          <a:p>
+            <a:pPr algn="ctr"/>
+            <a:endParaRPr lang="en-GB"/>
+          </a:p>
+        </p:txBody>
+      </p:sp>
+      <p:sp>
+        <p:nvSpPr>
           <p:cNvPr id="4" name="Title 3">
             <a:extLst>
               <a:ext uri="{FF2B5EF4-FFF2-40B4-BE49-F238E27FC236}">
@@ -5717,7 +6902,11 @@
           <a:lstStyle/>
           <a:p>
             <a:r>
-              <a:rPr lang="en-US" sz="4800"/>
+              <a:rPr lang="en-US" sz="4800" dirty="0">
+                <a:solidFill>
+                  <a:srgbClr val="FFC000"/>
+                </a:solidFill>
+              </a:rPr>
               <a:t>What we used</a:t>
             </a:r>
           </a:p>
@@ -5752,74 +6941,150 @@
           <a:lstStyle/>
           <a:p>
             <a:r>
-              <a:rPr lang="en-US" sz="1700"/>
+              <a:rPr lang="en-US" sz="1700" dirty="0">
+                <a:solidFill>
+                  <a:srgbClr val="023047"/>
+                </a:solidFill>
+              </a:rPr>
               <a:t>A programmable device (laptop or desktop PC) with:</a:t>
             </a:r>
           </a:p>
           <a:p>
             <a:pPr lvl="1"/>
             <a:r>
-              <a:rPr lang="en-US" sz="1700"/>
+              <a:rPr lang="en-US" sz="1700" dirty="0">
+                <a:solidFill>
+                  <a:srgbClr val="023047"/>
+                </a:solidFill>
+              </a:rPr>
               <a:t>A camera for visual input</a:t>
             </a:r>
           </a:p>
           <a:p>
             <a:pPr lvl="1"/>
             <a:r>
-              <a:rPr lang="en-US" sz="1700"/>
+              <a:rPr lang="en-US" sz="1700" dirty="0">
+                <a:solidFill>
+                  <a:srgbClr val="023047"/>
+                </a:solidFill>
+              </a:rPr>
               <a:t>A microphone for audio input</a:t>
             </a:r>
           </a:p>
           <a:p>
             <a:pPr lvl="1"/>
             <a:r>
-              <a:rPr lang="en-US" sz="1700"/>
+              <a:rPr lang="en-US" sz="1700" dirty="0">
+                <a:solidFill>
+                  <a:srgbClr val="023047"/>
+                </a:solidFill>
+              </a:rPr>
               <a:t>Speakers for audio output</a:t>
             </a:r>
           </a:p>
           <a:p>
             <a:r>
-              <a:rPr lang="en-US" sz="1700"/>
+              <a:rPr lang="en-US" sz="1700" dirty="0">
+                <a:solidFill>
+                  <a:srgbClr val="023047"/>
+                </a:solidFill>
+              </a:rPr>
               <a:t>Programming language: Python 3.8</a:t>
             </a:r>
           </a:p>
           <a:p>
             <a:r>
-              <a:rPr lang="en-US" sz="1700"/>
+              <a:rPr lang="en-US" sz="1700" dirty="0">
+                <a:solidFill>
+                  <a:srgbClr val="023047"/>
+                </a:solidFill>
+              </a:rPr>
               <a:t>Libraries for input processing:</a:t>
             </a:r>
           </a:p>
           <a:p>
             <a:pPr lvl="1"/>
             <a:r>
-              <a:rPr lang="en-US" sz="1700"/>
+              <a:rPr lang="en-US" sz="1700" dirty="0">
+                <a:solidFill>
+                  <a:srgbClr val="023047"/>
+                </a:solidFill>
+              </a:rPr>
               <a:t>OpenCV (visual input, face detection)</a:t>
             </a:r>
           </a:p>
           <a:p>
             <a:pPr lvl="1"/>
             <a:r>
-              <a:rPr lang="en-US" sz="1700"/>
-              <a:t>Face_recognition (uses dlib; processing visual inputs)</a:t>
+              <a:rPr lang="en-US" sz="1700" dirty="0" err="1">
+                <a:solidFill>
+                  <a:srgbClr val="023047"/>
+                </a:solidFill>
+              </a:rPr>
+              <a:t>Face_recognition</a:t>
+            </a:r>
+            <a:r>
+              <a:rPr lang="en-US" sz="1700" dirty="0">
+                <a:solidFill>
+                  <a:srgbClr val="023047"/>
+                </a:solidFill>
+              </a:rPr>
+              <a:t> (uses </a:t>
+            </a:r>
+            <a:r>
+              <a:rPr lang="en-US" sz="1700" dirty="0" err="1">
+                <a:solidFill>
+                  <a:srgbClr val="023047"/>
+                </a:solidFill>
+              </a:rPr>
+              <a:t>dlib</a:t>
+            </a:r>
+            <a:r>
+              <a:rPr lang="en-US" sz="1700" dirty="0">
+                <a:solidFill>
+                  <a:srgbClr val="023047"/>
+                </a:solidFill>
+              </a:rPr>
+              <a:t>; processing visual inputs)</a:t>
             </a:r>
           </a:p>
           <a:p>
             <a:pPr lvl="1"/>
             <a:r>
-              <a:rPr lang="en-US" sz="1700"/>
+              <a:rPr lang="en-US" sz="1700" dirty="0">
+                <a:solidFill>
+                  <a:srgbClr val="023047"/>
+                </a:solidFill>
+              </a:rPr>
               <a:t>Pyttsx3 (audio output, works offline)</a:t>
             </a:r>
           </a:p>
           <a:p>
             <a:pPr lvl="1"/>
             <a:r>
-              <a:rPr lang="en-US" sz="1700"/>
-              <a:t>Speechrecognition (handles audio input, both online and offline)</a:t>
+              <a:rPr lang="en-US" sz="1700" dirty="0" err="1">
+                <a:solidFill>
+                  <a:srgbClr val="023047"/>
+                </a:solidFill>
+              </a:rPr>
+              <a:t>Speechrecognition</a:t>
+            </a:r>
+            <a:r>
+              <a:rPr lang="en-US" sz="1700" dirty="0">
+                <a:solidFill>
+                  <a:srgbClr val="023047"/>
+                </a:solidFill>
+              </a:rPr>
+              <a:t> (handles audio input, both online and offline)</a:t>
             </a:r>
           </a:p>
           <a:p>
             <a:pPr lvl="1"/>
-            <a:endParaRPr lang="en-US" sz="1700"/>
+            <a:endParaRPr lang="en-US" sz="1700" dirty="0">
+              <a:solidFill>
+                <a:srgbClr val="023047"/>
+              </a:solidFill>
+            </a:endParaRPr>
           </a:p>
         </p:txBody>
       </p:sp>
@@ -5888,7 +7153,7 @@
 </p:sld>
 </file>
 
-<file path=ppt/slides/slide5.xml><?xml version="1.0" encoding="utf-8"?>
+<file path=ppt/slides/slide6.xml><?xml version="1.0" encoding="utf-8"?>
 <p:sld xmlns:a="http://schemas.openxmlformats.org/drawingml/2006/main" xmlns:r="http://schemas.openxmlformats.org/officeDocument/2006/relationships" xmlns:p="http://schemas.openxmlformats.org/presentationml/2006/main">
   <p:cSld>
     <p:bg>
@@ -6319,25 +7584,41 @@
           <a:lstStyle/>
           <a:p>
             <a:r>
-              <a:rPr lang="en-US" sz="2400"/>
+              <a:rPr lang="en-US" sz="2400" dirty="0">
+                <a:solidFill>
+                  <a:srgbClr val="023047"/>
+                </a:solidFill>
+              </a:rPr>
               <a:t>Once the device is turned on, it should be placed somewhere where the user wants to be and can be easily identified, recognized and interacted with</a:t>
             </a:r>
           </a:p>
           <a:p>
             <a:r>
-              <a:rPr lang="en-US" sz="2400"/>
+              <a:rPr lang="en-US" sz="2400" dirty="0">
+                <a:solidFill>
+                  <a:srgbClr val="023047"/>
+                </a:solidFill>
+              </a:rPr>
               <a:t>The assistant will continuously monitor the camera searching for a successful detection</a:t>
             </a:r>
           </a:p>
           <a:p>
             <a:r>
-              <a:rPr lang="en-US" sz="2400"/>
+              <a:rPr lang="en-US" sz="2400" dirty="0">
+                <a:solidFill>
+                  <a:srgbClr val="023047"/>
+                </a:solidFill>
+              </a:rPr>
               <a:t>Once a face is detected, it attempts to recognize the person automatically</a:t>
             </a:r>
           </a:p>
           <a:p>
             <a:r>
-              <a:rPr lang="en-US" sz="2400"/>
+              <a:rPr lang="en-US" sz="2400" dirty="0">
+                <a:solidFill>
+                  <a:srgbClr val="023047"/>
+                </a:solidFill>
+              </a:rPr>
               <a:t>Failsafe: should recognition fail, ask the person to pronounce their name</a:t>
             </a:r>
           </a:p>
@@ -6408,7 +7689,7 @@
 </p:sld>
 </file>
 
-<file path=ppt/slides/slide6.xml><?xml version="1.0" encoding="utf-8"?>
+<file path=ppt/slides/slide7.xml><?xml version="1.0" encoding="utf-8"?>
 <p:sld xmlns:a="http://schemas.openxmlformats.org/drawingml/2006/main" xmlns:r="http://schemas.openxmlformats.org/officeDocument/2006/relationships" xmlns:p="http://schemas.openxmlformats.org/presentationml/2006/main">
   <p:cSld>
     <p:spTree>
@@ -6447,17 +7728,33 @@
           <a:lstStyle/>
           <a:p>
             <a:r>
-              <a:rPr lang="en-US" sz="3200" dirty="0"/>
+              <a:rPr lang="en-US" sz="3200" dirty="0">
+                <a:solidFill>
+                  <a:srgbClr val="023047"/>
+                </a:solidFill>
+              </a:rPr>
               <a:t>Interaction structure pt. I recognizing a user</a:t>
             </a:r>
             <a:br>
-              <a:rPr lang="en-US" sz="3200" dirty="0"/>
+              <a:rPr lang="en-US" sz="3200" dirty="0">
+                <a:solidFill>
+                  <a:srgbClr val="023047"/>
+                </a:solidFill>
+              </a:rPr>
             </a:br>
             <a:r>
-              <a:rPr lang="en-US" sz="3200" dirty="0"/>
+              <a:rPr lang="en-US" sz="3200" dirty="0">
+                <a:solidFill>
+                  <a:srgbClr val="023047"/>
+                </a:solidFill>
+              </a:rPr>
               <a:t>Deeper dive</a:t>
             </a:r>
-            <a:endParaRPr lang="en-US" dirty="0"/>
+            <a:endParaRPr lang="en-US" dirty="0">
+              <a:solidFill>
+                <a:srgbClr val="023047"/>
+              </a:solidFill>
+            </a:endParaRPr>
           </a:p>
         </p:txBody>
       </p:sp>
@@ -6514,7 +7811,11 @@
           <a:lstStyle/>
           <a:p>
             <a:r>
-              <a:rPr lang="en-US" dirty="0"/>
+              <a:rPr lang="en-US" dirty="0">
+                <a:solidFill>
+                  <a:srgbClr val="023047"/>
+                </a:solidFill>
+              </a:rPr>
               <a:t>Three steps are involved in making the interaction happen:</a:t>
             </a:r>
           </a:p>
@@ -6524,7 +7825,11 @@
               <a:buAutoNum type="arabicPeriod"/>
             </a:pPr>
             <a:r>
-              <a:rPr lang="en-US" dirty="0"/>
+              <a:rPr lang="en-US" dirty="0">
+                <a:solidFill>
+                  <a:srgbClr val="023047"/>
+                </a:solidFill>
+              </a:rPr>
               <a:t>Start the camera and a continuous loop where we gather the current image the camera is receiving</a:t>
             </a:r>
           </a:p>
@@ -6534,15 +7839,27 @@
               <a:buAutoNum type="arabicPeriod"/>
             </a:pPr>
             <a:r>
-              <a:rPr lang="en-US" dirty="0"/>
+              <a:rPr lang="en-US" dirty="0">
+                <a:solidFill>
+                  <a:srgbClr val="023047"/>
+                </a:solidFill>
+              </a:rPr>
               <a:t>Send the captured frame over to the </a:t>
             </a:r>
             <a:r>
-              <a:rPr lang="en-US" dirty="0" err="1"/>
+              <a:rPr lang="en-US" dirty="0" err="1">
+                <a:solidFill>
+                  <a:srgbClr val="023047"/>
+                </a:solidFill>
+              </a:rPr>
               <a:t>detect_presence</a:t>
             </a:r>
             <a:r>
-              <a:rPr lang="en-US" dirty="0"/>
+              <a:rPr lang="en-US" dirty="0">
+                <a:solidFill>
+                  <a:srgbClr val="023047"/>
+                </a:solidFill>
+              </a:rPr>
               <a:t> method:</a:t>
             </a:r>
           </a:p>
@@ -6552,7 +7869,11 @@
               <a:buAutoNum type="arabicPeriod"/>
             </a:pPr>
             <a:r>
-              <a:rPr lang="en-US" dirty="0"/>
+              <a:rPr lang="en-US" dirty="0">
+                <a:solidFill>
+                  <a:srgbClr val="023047"/>
+                </a:solidFill>
+              </a:rPr>
               <a:t>Converts the frame in B&amp;W</a:t>
             </a:r>
           </a:p>
@@ -6562,31 +7883,59 @@
               <a:buAutoNum type="arabicPeriod"/>
             </a:pPr>
             <a:r>
-              <a:rPr lang="en-US" dirty="0"/>
+              <a:rPr lang="en-US" dirty="0">
+                <a:solidFill>
+                  <a:srgbClr val="023047"/>
+                </a:solidFill>
+              </a:rPr>
               <a:t>Uses the preloaded </a:t>
             </a:r>
             <a:r>
-              <a:rPr lang="en-US" dirty="0" err="1"/>
+              <a:rPr lang="en-US" dirty="0" err="1">
+                <a:solidFill>
+                  <a:srgbClr val="023047"/>
+                </a:solidFill>
+              </a:rPr>
               <a:t>opencv</a:t>
             </a:r>
             <a:r>
-              <a:rPr lang="en-US" dirty="0"/>
+              <a:rPr lang="en-US" dirty="0">
+                <a:solidFill>
+                  <a:srgbClr val="023047"/>
+                </a:solidFill>
+              </a:rPr>
               <a:t> </a:t>
             </a:r>
             <a:r>
-              <a:rPr lang="en-US" dirty="0" err="1"/>
+              <a:rPr lang="en-US" dirty="0" err="1">
+                <a:solidFill>
+                  <a:srgbClr val="023047"/>
+                </a:solidFill>
+              </a:rPr>
               <a:t>CascadeClassifier</a:t>
             </a:r>
             <a:r>
-              <a:rPr lang="en-US" dirty="0"/>
+              <a:rPr lang="en-US" dirty="0">
+                <a:solidFill>
+                  <a:srgbClr val="023047"/>
+                </a:solidFill>
+              </a:rPr>
               <a:t> with </a:t>
             </a:r>
             <a:r>
-              <a:rPr lang="en-US" dirty="0" err="1"/>
+              <a:rPr lang="en-US" dirty="0" err="1">
+                <a:solidFill>
+                  <a:srgbClr val="023047"/>
+                </a:solidFill>
+              </a:rPr>
               <a:t>Haar</a:t>
             </a:r>
             <a:r>
-              <a:rPr lang="en-US" dirty="0"/>
+              <a:rPr lang="en-US" dirty="0">
+                <a:solidFill>
+                  <a:srgbClr val="023047"/>
+                </a:solidFill>
+              </a:rPr>
               <a:t> Cascades to attempt detection</a:t>
             </a:r>
           </a:p>
@@ -6596,7 +7945,11 @@
               <a:buAutoNum type="arabicPeriod"/>
             </a:pPr>
             <a:r>
-              <a:rPr lang="en-US" dirty="0"/>
+              <a:rPr lang="en-US" dirty="0">
+                <a:solidFill>
+                  <a:srgbClr val="023047"/>
+                </a:solidFill>
+              </a:rPr>
               <a:t>Attempt recognizing the person from the frame they have been detected in:</a:t>
             </a:r>
           </a:p>
@@ -6606,7 +7959,11 @@
               <a:buAutoNum type="arabicPeriod"/>
             </a:pPr>
             <a:r>
-              <a:rPr lang="en-US" dirty="0"/>
+              <a:rPr lang="en-US" dirty="0">
+                <a:solidFill>
+                  <a:srgbClr val="023047"/>
+                </a:solidFill>
+              </a:rPr>
               <a:t>Generate face encodings for each face</a:t>
             </a:r>
           </a:p>
@@ -6616,7 +7973,11 @@
               <a:buAutoNum type="arabicPeriod"/>
             </a:pPr>
             <a:r>
-              <a:rPr lang="en-US" dirty="0"/>
+              <a:rPr lang="en-US" dirty="0">
+                <a:solidFill>
+                  <a:srgbClr val="023047"/>
+                </a:solidFill>
+              </a:rPr>
               <a:t>Compare each encoding to the ones locally saved for each member until there is a match</a:t>
             </a:r>
           </a:p>
@@ -6626,7 +7987,11 @@
               <a:buAutoNum type="arabicPeriod"/>
             </a:pPr>
             <a:r>
-              <a:rPr lang="en-US" dirty="0"/>
+              <a:rPr lang="en-US" dirty="0">
+                <a:solidFill>
+                  <a:srgbClr val="023047"/>
+                </a:solidFill>
+              </a:rPr>
               <a:t>If all else fails, ask the person to identify themselves by using voice</a:t>
             </a:r>
           </a:p>
@@ -6735,7 +8100,7 @@
 </p:sld>
 </file>
 
-<file path=ppt/slides/slide7.xml><?xml version="1.0" encoding="utf-8"?>
+<file path=ppt/slides/slide8.xml><?xml version="1.0" encoding="utf-8"?>
 <p:sld xmlns:a="http://schemas.openxmlformats.org/drawingml/2006/main" xmlns:r="http://schemas.openxmlformats.org/officeDocument/2006/relationships" xmlns:p="http://schemas.openxmlformats.org/presentationml/2006/main">
   <p:cSld>
     <p:spTree>
@@ -6907,7 +8272,7 @@
 </p:sld>
 </file>
 
-<file path=ppt/slides/slide8.xml><?xml version="1.0" encoding="utf-8"?>
+<file path=ppt/slides/slide9.xml><?xml version="1.0" encoding="utf-8"?>
 <p:sld xmlns:a="http://schemas.openxmlformats.org/drawingml/2006/main" xmlns:r="http://schemas.openxmlformats.org/officeDocument/2006/relationships" xmlns:p="http://schemas.openxmlformats.org/presentationml/2006/main">
   <p:cSld>
     <p:bg>
@@ -7021,7 +8386,7 @@
           <a:lstStyle/>
           <a:p>
             <a:r>
-              <a:rPr lang="en-US" sz="2500"/>
+              <a:rPr lang="en-US" sz="2500" dirty="0"/>
               <a:t>Interaction structure pt. I: what if they can’t be recognized?</a:t>
             </a:r>
           </a:p>
@@ -7277,7 +8642,7 @@
               <a:buChar char="•"/>
             </a:pPr>
             <a:r>
-              <a:rPr lang="en-US" sz="1900"/>
+              <a:rPr lang="en-US" sz="1900" dirty="0"/>
               <a:t>As said: registering is straight-forward:</a:t>
             </a:r>
           </a:p>
@@ -7287,7 +8652,7 @@
               <a:buChar char="•"/>
             </a:pPr>
             <a:r>
-              <a:rPr lang="en-US" sz="1900"/>
+              <a:rPr lang="en-US" sz="1900" dirty="0"/>
               <a:t>Ask the name which the person wants to register with</a:t>
             </a:r>
           </a:p>
@@ -7297,7 +8662,7 @@
               <a:buChar char="•"/>
             </a:pPr>
             <a:r>
-              <a:rPr lang="en-US" sz="1900"/>
+              <a:rPr lang="en-US" sz="1900" dirty="0"/>
               <a:t>We ask again as they might want to register with a name different from their real one!</a:t>
             </a:r>
           </a:p>
@@ -7307,7 +8672,7 @@
               <a:buChar char="•"/>
             </a:pPr>
             <a:r>
-              <a:rPr lang="en-US" sz="1900"/>
+              <a:rPr lang="en-US" sz="1900" dirty="0"/>
               <a:t>Compute face encodings from the detection frame (the frame that started it all)</a:t>
             </a:r>
           </a:p>
@@ -7317,7 +8682,7 @@
               <a:buChar char="•"/>
             </a:pPr>
             <a:r>
-              <a:rPr lang="en-US" sz="1900"/>
+              <a:rPr lang="en-US" sz="1900" dirty="0"/>
               <a:t>Create a new instance of the Member class, commit it to memory, and inform the user they are now part of the Clan</a:t>
             </a:r>
           </a:p>
@@ -7491,526 +8856,6 @@
     <p:extLst>
       <p:ext uri="{BB962C8B-B14F-4D97-AF65-F5344CB8AC3E}">
         <p14:creationId xmlns:p14="http://schemas.microsoft.com/office/powerpoint/2010/main" val="2782484819"/>
-      </p:ext>
-    </p:extLst>
-  </p:cSld>
-  <p:clrMapOvr>
-    <a:masterClrMapping/>
-  </p:clrMapOvr>
-</p:sld>
-</file>
-
-<file path=ppt/slides/slide9.xml><?xml version="1.0" encoding="utf-8"?>
-<p:sld xmlns:a="http://schemas.openxmlformats.org/drawingml/2006/main" xmlns:r="http://schemas.openxmlformats.org/officeDocument/2006/relationships" xmlns:p="http://schemas.openxmlformats.org/presentationml/2006/main">
-  <p:cSld>
-    <p:bg>
-      <p:bgPr>
-        <a:solidFill>
-          <a:schemeClr val="bg1"/>
-        </a:solidFill>
-        <a:effectLst/>
-      </p:bgPr>
-    </p:bg>
-    <p:spTree>
-      <p:nvGrpSpPr>
-        <p:cNvPr id="1" name=""/>
-        <p:cNvGrpSpPr/>
-        <p:nvPr/>
-      </p:nvGrpSpPr>
-      <p:grpSpPr>
-        <a:xfrm>
-          <a:off x="0" y="0"/>
-          <a:ext cx="0" cy="0"/>
-          <a:chOff x="0" y="0"/>
-          <a:chExt cx="0" cy="0"/>
-        </a:xfrm>
-      </p:grpSpPr>
-      <p:sp useBgFill="1">
-        <p:nvSpPr>
-          <p:cNvPr id="8" name="Rectangle 7">
-            <a:extLst>
-              <a:ext uri="{FF2B5EF4-FFF2-40B4-BE49-F238E27FC236}">
-                <a16:creationId xmlns:a16="http://schemas.microsoft.com/office/drawing/2014/main" id="{B6CDA21F-E7AF-4C75-8395-33F58D5B0E45}"/>
-              </a:ext>
-              <a:ext uri="{C183D7F6-B498-43B3-948B-1728B52AA6E4}">
-                <adec:decorative xmlns:adec="http://schemas.microsoft.com/office/drawing/2017/decorative" val="1"/>
-              </a:ext>
-            </a:extLst>
-          </p:cNvPr>
-          <p:cNvSpPr>
-            <a:spLocks noGrp="1" noRot="1" noChangeAspect="1" noMove="1" noResize="1" noEditPoints="1" noAdjustHandles="1" noChangeArrowheads="1" noChangeShapeType="1" noTextEdit="1"/>
-          </p:cNvSpPr>
-          <p:nvPr>
-            <p:extLst>
-              <p:ext uri="{386F3935-93C4-4BCD-93E2-E3B085C9AB24}">
-                <p16:designElem xmlns:p16="http://schemas.microsoft.com/office/powerpoint/2015/main" val="1"/>
-              </p:ext>
-            </p:extLst>
-          </p:nvPr>
-        </p:nvSpPr>
-        <p:spPr>
-          <a:xfrm>
-            <a:off x="0" y="0"/>
-            <a:ext cx="12191999" cy="6857365"/>
-          </a:xfrm>
-          <a:prstGeom prst="rect">
-            <a:avLst/>
-          </a:prstGeom>
-          <a:ln>
-            <a:noFill/>
-          </a:ln>
-        </p:spPr>
-        <p:style>
-          <a:lnRef idx="2">
-            <a:schemeClr val="accent1">
-              <a:shade val="50000"/>
-            </a:schemeClr>
-          </a:lnRef>
-          <a:fillRef idx="1">
-            <a:schemeClr val="accent1"/>
-          </a:fillRef>
-          <a:effectRef idx="0">
-            <a:schemeClr val="accent1"/>
-          </a:effectRef>
-          <a:fontRef idx="minor">
-            <a:schemeClr val="lt1"/>
-          </a:fontRef>
-        </p:style>
-        <p:txBody>
-          <a:bodyPr rtlCol="0" anchor="ctr"/>
-          <a:lstStyle/>
-          <a:p>
-            <a:pPr algn="ctr"/>
-            <a:endParaRPr lang="en-US"/>
-          </a:p>
-        </p:txBody>
-      </p:sp>
-      <p:grpSp>
-        <p:nvGrpSpPr>
-          <p:cNvPr id="10" name="Group 9">
-            <a:extLst>
-              <a:ext uri="{FF2B5EF4-FFF2-40B4-BE49-F238E27FC236}">
-                <a16:creationId xmlns:a16="http://schemas.microsoft.com/office/drawing/2014/main" id="{AE1C45F0-260A-458C-96ED-C1F6D2151219}"/>
-              </a:ext>
-              <a:ext uri="{C183D7F6-B498-43B3-948B-1728B52AA6E4}">
-                <adec:decorative xmlns:adec="http://schemas.microsoft.com/office/drawing/2017/decorative" val="1"/>
-              </a:ext>
-            </a:extLst>
-          </p:cNvPr>
-          <p:cNvGrpSpPr>
-            <a:grpSpLocks noGrp="1" noUngrp="1" noRot="1" noChangeAspect="1" noMove="1" noResize="1"/>
-          </p:cNvGrpSpPr>
-          <p:nvPr>
-            <p:extLst>
-              <p:ext uri="{386F3935-93C4-4BCD-93E2-E3B085C9AB24}">
-                <p16:designElem xmlns:p16="http://schemas.microsoft.com/office/powerpoint/2015/main" val="1"/>
-              </p:ext>
-            </p:extLst>
-          </p:nvPr>
-        </p:nvGrpSpPr>
-        <p:grpSpPr>
-          <a:xfrm>
-            <a:off x="4" y="1216597"/>
-            <a:ext cx="731521" cy="673460"/>
-            <a:chOff x="3940602" y="308034"/>
-            <a:chExt cx="2116791" cy="3428999"/>
-          </a:xfrm>
-          <a:solidFill>
-            <a:schemeClr val="accent4"/>
-          </a:solidFill>
-        </p:grpSpPr>
-        <p:sp>
-          <p:nvSpPr>
-            <p:cNvPr id="11" name="Rectangle 10">
-              <a:extLst>
-                <a:ext uri="{FF2B5EF4-FFF2-40B4-BE49-F238E27FC236}">
-                  <a16:creationId xmlns:a16="http://schemas.microsoft.com/office/drawing/2014/main" id="{A6604B49-AD5C-4590-B051-06C8222ECD99}"/>
-                </a:ext>
-                <a:ext uri="{C183D7F6-B498-43B3-948B-1728B52AA6E4}">
-                  <adec:decorative xmlns:adec="http://schemas.microsoft.com/office/drawing/2017/decorative" val="1"/>
-                </a:ext>
-              </a:extLst>
-            </p:cNvPr>
-            <p:cNvSpPr/>
-            <p:nvPr>
-              <p:extLst>
-                <p:ext uri="{386F3935-93C4-4BCD-93E2-E3B085C9AB24}">
-                  <p16:designElem xmlns:p16="http://schemas.microsoft.com/office/powerpoint/2015/main" val="1"/>
-                </p:ext>
-              </p:extLst>
-            </p:nvPr>
-          </p:nvSpPr>
-          <p:spPr>
-            <a:xfrm>
-              <a:off x="3940602" y="308034"/>
-              <a:ext cx="566743" cy="3428999"/>
-            </a:xfrm>
-            <a:prstGeom prst="rect">
-              <a:avLst/>
-            </a:prstGeom>
-            <a:grpFill/>
-            <a:ln>
-              <a:noFill/>
-            </a:ln>
-          </p:spPr>
-          <p:style>
-            <a:lnRef idx="2">
-              <a:schemeClr val="accent1">
-                <a:shade val="50000"/>
-              </a:schemeClr>
-            </a:lnRef>
-            <a:fillRef idx="1">
-              <a:schemeClr val="accent1"/>
-            </a:fillRef>
-            <a:effectRef idx="0">
-              <a:schemeClr val="accent1"/>
-            </a:effectRef>
-            <a:fontRef idx="minor">
-              <a:schemeClr val="lt1"/>
-            </a:fontRef>
-          </p:style>
-          <p:txBody>
-            <a:bodyPr rtlCol="0" anchor="ctr"/>
-            <a:lstStyle/>
-            <a:p>
-              <a:pPr algn="ctr"/>
-              <a:endParaRPr lang="en-US"/>
-            </a:p>
-          </p:txBody>
-        </p:sp>
-        <p:sp>
-          <p:nvSpPr>
-            <p:cNvPr id="12" name="Rectangle 11">
-              <a:extLst>
-                <a:ext uri="{FF2B5EF4-FFF2-40B4-BE49-F238E27FC236}">
-                  <a16:creationId xmlns:a16="http://schemas.microsoft.com/office/drawing/2014/main" id="{743ECCAF-29C5-4537-947C-7EA1292463DB}"/>
-                </a:ext>
-                <a:ext uri="{C183D7F6-B498-43B3-948B-1728B52AA6E4}">
-                  <adec:decorative xmlns:adec="http://schemas.microsoft.com/office/drawing/2017/decorative" val="1"/>
-                </a:ext>
-              </a:extLst>
-            </p:cNvPr>
-            <p:cNvSpPr/>
-            <p:nvPr>
-              <p:extLst>
-                <p:ext uri="{386F3935-93C4-4BCD-93E2-E3B085C9AB24}">
-                  <p16:designElem xmlns:p16="http://schemas.microsoft.com/office/powerpoint/2015/main" val="1"/>
-                </p:ext>
-              </p:extLst>
-            </p:nvPr>
-          </p:nvSpPr>
-          <p:spPr>
-            <a:xfrm>
-              <a:off x="4715626" y="308034"/>
-              <a:ext cx="566743" cy="3428999"/>
-            </a:xfrm>
-            <a:prstGeom prst="rect">
-              <a:avLst/>
-            </a:prstGeom>
-            <a:grpFill/>
-            <a:ln>
-              <a:noFill/>
-            </a:ln>
-          </p:spPr>
-          <p:style>
-            <a:lnRef idx="2">
-              <a:schemeClr val="accent1">
-                <a:shade val="50000"/>
-              </a:schemeClr>
-            </a:lnRef>
-            <a:fillRef idx="1">
-              <a:schemeClr val="accent1"/>
-            </a:fillRef>
-            <a:effectRef idx="0">
-              <a:schemeClr val="accent1"/>
-            </a:effectRef>
-            <a:fontRef idx="minor">
-              <a:schemeClr val="lt1"/>
-            </a:fontRef>
-          </p:style>
-          <p:txBody>
-            <a:bodyPr rtlCol="0" anchor="ctr"/>
-            <a:lstStyle/>
-            <a:p>
-              <a:pPr algn="ctr"/>
-              <a:endParaRPr lang="en-US"/>
-            </a:p>
-          </p:txBody>
-        </p:sp>
-        <p:sp>
-          <p:nvSpPr>
-            <p:cNvPr id="13" name="Rectangle 12">
-              <a:extLst>
-                <a:ext uri="{FF2B5EF4-FFF2-40B4-BE49-F238E27FC236}">
-                  <a16:creationId xmlns:a16="http://schemas.microsoft.com/office/drawing/2014/main" id="{ED49787B-8DE6-4467-AD0A-8DECC6E0C2D6}"/>
-                </a:ext>
-                <a:ext uri="{C183D7F6-B498-43B3-948B-1728B52AA6E4}">
-                  <adec:decorative xmlns:adec="http://schemas.microsoft.com/office/drawing/2017/decorative" val="1"/>
-                </a:ext>
-              </a:extLst>
-            </p:cNvPr>
-            <p:cNvSpPr/>
-            <p:nvPr>
-              <p:extLst>
-                <p:ext uri="{386F3935-93C4-4BCD-93E2-E3B085C9AB24}">
-                  <p16:designElem xmlns:p16="http://schemas.microsoft.com/office/powerpoint/2015/main" val="1"/>
-                </p:ext>
-              </p:extLst>
-            </p:nvPr>
-          </p:nvSpPr>
-          <p:spPr>
-            <a:xfrm>
-              <a:off x="5490650" y="308034"/>
-              <a:ext cx="566743" cy="3428999"/>
-            </a:xfrm>
-            <a:prstGeom prst="rect">
-              <a:avLst/>
-            </a:prstGeom>
-            <a:grpFill/>
-            <a:ln>
-              <a:noFill/>
-            </a:ln>
-          </p:spPr>
-          <p:style>
-            <a:lnRef idx="2">
-              <a:schemeClr val="accent1">
-                <a:shade val="50000"/>
-              </a:schemeClr>
-            </a:lnRef>
-            <a:fillRef idx="1">
-              <a:schemeClr val="accent1"/>
-            </a:fillRef>
-            <a:effectRef idx="0">
-              <a:schemeClr val="accent1"/>
-            </a:effectRef>
-            <a:fontRef idx="minor">
-              <a:schemeClr val="lt1"/>
-            </a:fontRef>
-          </p:style>
-          <p:txBody>
-            <a:bodyPr rtlCol="0" anchor="ctr"/>
-            <a:lstStyle/>
-            <a:p>
-              <a:pPr algn="ctr"/>
-              <a:endParaRPr lang="en-US"/>
-            </a:p>
-          </p:txBody>
-        </p:sp>
-      </p:grpSp>
-      <p:sp>
-        <p:nvSpPr>
-          <p:cNvPr id="15" name="Rectangle 14">
-            <a:extLst>
-              <a:ext uri="{FF2B5EF4-FFF2-40B4-BE49-F238E27FC236}">
-                <a16:creationId xmlns:a16="http://schemas.microsoft.com/office/drawing/2014/main" id="{D5B0017B-2ECA-49AF-B397-DC140825DF8D}"/>
-              </a:ext>
-              <a:ext uri="{C183D7F6-B498-43B3-948B-1728B52AA6E4}">
-                <adec:decorative xmlns:adec="http://schemas.microsoft.com/office/drawing/2017/decorative" val="1"/>
-              </a:ext>
-            </a:extLst>
-          </p:cNvPr>
-          <p:cNvSpPr>
-            <a:spLocks noGrp="1" noRot="1" noChangeAspect="1" noMove="1" noResize="1" noEditPoints="1" noAdjustHandles="1" noChangeArrowheads="1" noChangeShapeType="1" noTextEdit="1"/>
-          </p:cNvSpPr>
-          <p:nvPr>
-            <p:extLst>
-              <p:ext uri="{386F3935-93C4-4BCD-93E2-E3B085C9AB24}">
-                <p16:designElem xmlns:p16="http://schemas.microsoft.com/office/powerpoint/2015/main" val="1"/>
-              </p:ext>
-            </p:extLst>
-          </p:nvPr>
-        </p:nvSpPr>
-        <p:spPr>
-          <a:xfrm>
-            <a:off x="640079" y="613954"/>
-            <a:ext cx="10907487" cy="1894116"/>
-          </a:xfrm>
-          <a:prstGeom prst="rect">
-            <a:avLst/>
-          </a:prstGeom>
-          <a:solidFill>
-            <a:schemeClr val="bg1"/>
-          </a:solidFill>
-          <a:ln>
-            <a:noFill/>
-          </a:ln>
-          <a:effectLst>
-            <a:outerShdw blurRad="139700" dist="127000" dir="5400000" algn="t" rotWithShape="0">
-              <a:prstClr val="black">
-                <a:alpha val="15000"/>
-              </a:prstClr>
-            </a:outerShdw>
-          </a:effectLst>
-        </p:spPr>
-        <p:style>
-          <a:lnRef idx="2">
-            <a:schemeClr val="accent1">
-              <a:shade val="50000"/>
-            </a:schemeClr>
-          </a:lnRef>
-          <a:fillRef idx="1">
-            <a:schemeClr val="accent1"/>
-          </a:fillRef>
-          <a:effectRef idx="0">
-            <a:schemeClr val="accent1"/>
-          </a:effectRef>
-          <a:fontRef idx="minor">
-            <a:schemeClr val="lt1"/>
-          </a:fontRef>
-        </p:style>
-        <p:txBody>
-          <a:bodyPr rtlCol="0" anchor="ctr"/>
-          <a:lstStyle/>
-          <a:p>
-            <a:pPr algn="ctr"/>
-            <a:endParaRPr lang="en-US"/>
-          </a:p>
-        </p:txBody>
-      </p:sp>
-      <p:sp>
-        <p:nvSpPr>
-          <p:cNvPr id="2" name="Title 1">
-            <a:extLst>
-              <a:ext uri="{FF2B5EF4-FFF2-40B4-BE49-F238E27FC236}">
-                <a16:creationId xmlns:a16="http://schemas.microsoft.com/office/drawing/2014/main" id="{292106E7-BD60-43C1-922B-4619E77E2AF3}"/>
-              </a:ext>
-            </a:extLst>
-          </p:cNvPr>
-          <p:cNvSpPr>
-            <a:spLocks noGrp="1"/>
-          </p:cNvSpPr>
-          <p:nvPr>
-            <p:ph type="title"/>
-          </p:nvPr>
-        </p:nvSpPr>
-        <p:spPr>
-          <a:xfrm>
-            <a:off x="1043631" y="809898"/>
-            <a:ext cx="9942716" cy="1554480"/>
-          </a:xfrm>
-        </p:spPr>
-        <p:txBody>
-          <a:bodyPr anchor="ctr">
-            <a:normAutofit/>
-          </a:bodyPr>
-          <a:lstStyle/>
-          <a:p>
-            <a:r>
-              <a:rPr lang="en-US" sz="4800"/>
-              <a:t>Interaction structure pt. II let’s have a talk</a:t>
-            </a:r>
-          </a:p>
-        </p:txBody>
-      </p:sp>
-      <p:sp>
-        <p:nvSpPr>
-          <p:cNvPr id="3" name="Content Placeholder 2">
-            <a:extLst>
-              <a:ext uri="{FF2B5EF4-FFF2-40B4-BE49-F238E27FC236}">
-                <a16:creationId xmlns:a16="http://schemas.microsoft.com/office/drawing/2014/main" id="{182AEB85-8B47-4ECB-932A-E56BBCEB062D}"/>
-              </a:ext>
-            </a:extLst>
-          </p:cNvPr>
-          <p:cNvSpPr>
-            <a:spLocks noGrp="1"/>
-          </p:cNvSpPr>
-          <p:nvPr>
-            <p:ph idx="1"/>
-          </p:nvPr>
-        </p:nvSpPr>
-        <p:spPr>
-          <a:xfrm>
-            <a:off x="1045028" y="3017522"/>
-            <a:ext cx="9941319" cy="3124658"/>
-          </a:xfrm>
-        </p:spPr>
-        <p:txBody>
-          <a:bodyPr anchor="ctr">
-            <a:normAutofit/>
-          </a:bodyPr>
-          <a:lstStyle/>
-          <a:p>
-            <a:r>
-              <a:rPr lang="en-US" sz="2400"/>
-              <a:t>Once a user is successfully recognized, interaction begins</a:t>
-            </a:r>
-          </a:p>
-          <a:p>
-            <a:r>
-              <a:rPr lang="en-US" sz="2400"/>
-              <a:t>The assistant initiates it, greeting the user and informing them of (eventual) pending notes left by other users of the same device</a:t>
-            </a:r>
-          </a:p>
-          <a:p>
-            <a:r>
-              <a:rPr lang="en-US" sz="2400"/>
-              <a:t>If the user is still in the room, it will further interact, asking if they want to leave notes for others, or remove or edit unheard notes they sent</a:t>
-            </a:r>
-          </a:p>
-          <a:p>
-            <a:r>
-              <a:rPr lang="en-US" sz="2400"/>
-              <a:t>Interaction terminates any time the user asks for exiting or leaves the camera frame entirely</a:t>
-            </a:r>
-          </a:p>
-        </p:txBody>
-      </p:sp>
-      <p:cxnSp>
-        <p:nvCxnSpPr>
-          <p:cNvPr id="17" name="Straight Connector 16">
-            <a:extLst>
-              <a:ext uri="{FF2B5EF4-FFF2-40B4-BE49-F238E27FC236}">
-                <a16:creationId xmlns:a16="http://schemas.microsoft.com/office/drawing/2014/main" id="{6CF1BAF6-AD41-4082-B212-8A1F9A2E8779}"/>
-              </a:ext>
-              <a:ext uri="{C183D7F6-B498-43B3-948B-1728B52AA6E4}">
-                <adec:decorative xmlns:adec="http://schemas.microsoft.com/office/drawing/2017/decorative" val="1"/>
-              </a:ext>
-            </a:extLst>
-          </p:cNvPr>
-          <p:cNvCxnSpPr>
-            <a:cxnSpLocks noGrp="1" noRot="1" noChangeAspect="1" noMove="1" noResize="1" noEditPoints="1" noAdjustHandles="1" noChangeArrowheads="1" noChangeShapeType="1"/>
-          </p:cNvCxnSpPr>
-          <p:nvPr>
-            <p:extLst>
-              <p:ext uri="{386F3935-93C4-4BCD-93E2-E3B085C9AB24}">
-                <p16:designElem xmlns:p16="http://schemas.microsoft.com/office/powerpoint/2015/main" val="1"/>
-              </p:ext>
-            </p:extLst>
-          </p:nvPr>
-        </p:nvCxnSpPr>
-        <p:spPr>
-          <a:xfrm flipH="1">
-            <a:off x="838200" y="6485313"/>
-            <a:ext cx="10515600" cy="0"/>
-          </a:xfrm>
-          <a:prstGeom prst="line">
-            <a:avLst/>
-          </a:prstGeom>
-          <a:ln w="57150">
-            <a:solidFill>
-              <a:schemeClr val="accent4"/>
-            </a:solidFill>
-          </a:ln>
-        </p:spPr>
-        <p:style>
-          <a:lnRef idx="1">
-            <a:schemeClr val="accent1"/>
-          </a:lnRef>
-          <a:fillRef idx="0">
-            <a:schemeClr val="accent1"/>
-          </a:fillRef>
-          <a:effectRef idx="0">
-            <a:schemeClr val="accent1"/>
-          </a:effectRef>
-          <a:fontRef idx="minor">
-            <a:schemeClr val="tx1"/>
-          </a:fontRef>
-        </p:style>
-      </p:cxnSp>
-    </p:spTree>
-    <p:extLst>
-      <p:ext uri="{BB962C8B-B14F-4D97-AF65-F5344CB8AC3E}">
-        <p14:creationId xmlns:p14="http://schemas.microsoft.com/office/powerpoint/2010/main" val="2344798236"/>
       </p:ext>
     </p:extLst>
   </p:cSld>

</xml_diff>